<commit_message>
Created inital pptx content
</commit_message>
<xml_diff>
--- a/FactSheet.pptx
+++ b/FactSheet.pptx
@@ -112,6 +112,11 @@
       </a:defRPr>
     </a:lvl9pPr>
   </p:defaultTextStyle>
+  <p:extLst>
+    <p:ext uri="{EFAFB233-063F-42B5-8137-9DF3F51BA10A}">
+      <p15:sldGuideLst xmlns:p15="http://schemas.microsoft.com/office/powerpoint/2012/main"/>
+    </p:ext>
+  </p:extLst>
 </p:presentation>
 </file>
 
@@ -262,7 +267,7 @@
           <a:p>
             <a:fld id="{940153A5-B7BB-EA44-92A0-157095F36AA1}" type="datetimeFigureOut">
               <a:rPr lang="en-US" smtClean="0"/>
-              <a:t>5/16/18</a:t>
+              <a:t>5/18/2018</a:t>
             </a:fld>
             <a:endParaRPr lang="en-US"/>
           </a:p>
@@ -460,7 +465,7 @@
           <a:p>
             <a:fld id="{940153A5-B7BB-EA44-92A0-157095F36AA1}" type="datetimeFigureOut">
               <a:rPr lang="en-US" smtClean="0"/>
-              <a:t>5/16/18</a:t>
+              <a:t>5/18/2018</a:t>
             </a:fld>
             <a:endParaRPr lang="en-US"/>
           </a:p>
@@ -668,7 +673,7 @@
           <a:p>
             <a:fld id="{940153A5-B7BB-EA44-92A0-157095F36AA1}" type="datetimeFigureOut">
               <a:rPr lang="en-US" smtClean="0"/>
-              <a:t>5/16/18</a:t>
+              <a:t>5/18/2018</a:t>
             </a:fld>
             <a:endParaRPr lang="en-US"/>
           </a:p>
@@ -866,7 +871,7 @@
           <a:p>
             <a:fld id="{940153A5-B7BB-EA44-92A0-157095F36AA1}" type="datetimeFigureOut">
               <a:rPr lang="en-US" smtClean="0"/>
-              <a:t>5/16/18</a:t>
+              <a:t>5/18/2018</a:t>
             </a:fld>
             <a:endParaRPr lang="en-US"/>
           </a:p>
@@ -1141,7 +1146,7 @@
           <a:p>
             <a:fld id="{940153A5-B7BB-EA44-92A0-157095F36AA1}" type="datetimeFigureOut">
               <a:rPr lang="en-US" smtClean="0"/>
-              <a:t>5/16/18</a:t>
+              <a:t>5/18/2018</a:t>
             </a:fld>
             <a:endParaRPr lang="en-US"/>
           </a:p>
@@ -1406,7 +1411,7 @@
           <a:p>
             <a:fld id="{940153A5-B7BB-EA44-92A0-157095F36AA1}" type="datetimeFigureOut">
               <a:rPr lang="en-US" smtClean="0"/>
-              <a:t>5/16/18</a:t>
+              <a:t>5/18/2018</a:t>
             </a:fld>
             <a:endParaRPr lang="en-US"/>
           </a:p>
@@ -1818,7 +1823,7 @@
           <a:p>
             <a:fld id="{940153A5-B7BB-EA44-92A0-157095F36AA1}" type="datetimeFigureOut">
               <a:rPr lang="en-US" smtClean="0"/>
-              <a:t>5/16/18</a:t>
+              <a:t>5/18/2018</a:t>
             </a:fld>
             <a:endParaRPr lang="en-US"/>
           </a:p>
@@ -1959,7 +1964,7 @@
           <a:p>
             <a:fld id="{940153A5-B7BB-EA44-92A0-157095F36AA1}" type="datetimeFigureOut">
               <a:rPr lang="en-US" smtClean="0"/>
-              <a:t>5/16/18</a:t>
+              <a:t>5/18/2018</a:t>
             </a:fld>
             <a:endParaRPr lang="en-US"/>
           </a:p>
@@ -2072,7 +2077,7 @@
           <a:p>
             <a:fld id="{940153A5-B7BB-EA44-92A0-157095F36AA1}" type="datetimeFigureOut">
               <a:rPr lang="en-US" smtClean="0"/>
-              <a:t>5/16/18</a:t>
+              <a:t>5/18/2018</a:t>
             </a:fld>
             <a:endParaRPr lang="en-US"/>
           </a:p>
@@ -2383,7 +2388,7 @@
           <a:p>
             <a:fld id="{940153A5-B7BB-EA44-92A0-157095F36AA1}" type="datetimeFigureOut">
               <a:rPr lang="en-US" smtClean="0"/>
-              <a:t>5/16/18</a:t>
+              <a:t>5/18/2018</a:t>
             </a:fld>
             <a:endParaRPr lang="en-US"/>
           </a:p>
@@ -2671,7 +2676,7 @@
           <a:p>
             <a:fld id="{940153A5-B7BB-EA44-92A0-157095F36AA1}" type="datetimeFigureOut">
               <a:rPr lang="en-US" smtClean="0"/>
-              <a:t>5/16/18</a:t>
+              <a:t>5/18/2018</a:t>
             </a:fld>
             <a:endParaRPr lang="en-US"/>
           </a:p>
@@ -2912,7 +2917,7 @@
           <a:p>
             <a:fld id="{940153A5-B7BB-EA44-92A0-157095F36AA1}" type="datetimeFigureOut">
               <a:rPr lang="en-US" smtClean="0"/>
-              <a:t>5/16/18</a:t>
+              <a:t>5/18/2018</a:t>
             </a:fld>
             <a:endParaRPr lang="en-US"/>
           </a:p>
@@ -3379,9 +3384,10 @@
           <a:lstStyle/>
           <a:p>
             <a:r>
-              <a:rPr lang="en-US" dirty="0"/>
-              <a:t>&lt;&lt;Project Title&gt;&gt;</a:t>
-            </a:r>
+              <a:rPr lang="en-US" dirty="0" smtClean="0"/>
+              <a:t>Failback</a:t>
+            </a:r>
+            <a:endParaRPr lang="en-US" dirty="0"/>
           </a:p>
         </p:txBody>
       </p:sp>
@@ -3498,8 +3504,35 @@
               <a:buNone/>
             </a:pPr>
             <a:r>
-              <a:rPr lang="en-US" dirty="0"/>
-              <a:t>&lt;&lt;names of the people that worked on the project, if your pet collaborated you can add him/her as well&gt;&gt;</a:t>
+              <a:rPr lang="en-US" dirty="0" smtClean="0"/>
+              <a:t>Tom Van Cauwenberghe</a:t>
+            </a:r>
+          </a:p>
+          <a:p>
+            <a:pPr marL="0" indent="0">
+              <a:buNone/>
+            </a:pPr>
+            <a:r>
+              <a:rPr lang="en-US" dirty="0" smtClean="0"/>
+              <a:t>Tom Janssens</a:t>
+            </a:r>
+          </a:p>
+          <a:p>
+            <a:pPr marL="0" indent="0">
+              <a:buNone/>
+            </a:pPr>
+            <a:r>
+              <a:rPr lang="en-US" dirty="0" smtClean="0"/>
+              <a:t>Glenn Van Weyenberg</a:t>
+            </a:r>
+          </a:p>
+          <a:p>
+            <a:pPr marL="0" indent="0">
+              <a:buNone/>
+            </a:pPr>
+            <a:r>
+              <a:rPr lang="en-US" dirty="0" smtClean="0"/>
+              <a:t>Tim Pauwels</a:t>
             </a:r>
           </a:p>
         </p:txBody>
@@ -3821,9 +3854,27 @@
               <a:buNone/>
             </a:pPr>
             <a:r>
-              <a:rPr lang="en-US" dirty="0"/>
-              <a:t>&lt;&lt;A momentary lapse of reason? Pregnancy Amnesia? You surely remember why you wanted to do this project.&gt;&gt;</a:t>
-            </a:r>
+              <a:rPr lang="en-US" dirty="0" smtClean="0"/>
+              <a:t>A customer application we’ve been working on has a heavy dependency on an external web service that is very unreliable.</a:t>
+            </a:r>
+          </a:p>
+          <a:p>
+            <a:pPr marL="0" indent="0">
+              <a:buFont typeface="Arial" panose="020B0604020202020204" pitchFamily="34" charset="0"/>
+              <a:buNone/>
+            </a:pPr>
+            <a:endParaRPr lang="en-US" dirty="0"/>
+          </a:p>
+          <a:p>
+            <a:pPr marL="0" indent="0">
+              <a:buFont typeface="Arial" panose="020B0604020202020204" pitchFamily="34" charset="0"/>
+              <a:buNone/>
+            </a:pPr>
+            <a:r>
+              <a:rPr lang="en-US" dirty="0" smtClean="0"/>
+              <a:t>Outage of this dependency is sometimes scheduled, but most of the times it is unexpected. This leads to overhead.</a:t>
+            </a:r>
+            <a:endParaRPr lang="en-US" dirty="0"/>
           </a:p>
         </p:txBody>
       </p:sp>
@@ -3910,9 +3961,26 @@
               <a:buNone/>
             </a:pPr>
             <a:r>
-              <a:rPr lang="en-US" dirty="0"/>
-              <a:t>&lt;&lt;describe what you initially set out to do&gt;&gt;</a:t>
-            </a:r>
+              <a:rPr lang="en-US" dirty="0" smtClean="0"/>
+              <a:t>Create an infrastructure that allows for automatic fallback to cached responses. </a:t>
+            </a:r>
+            <a:endParaRPr lang="en-US" dirty="0"/>
+          </a:p>
+          <a:p>
+            <a:pPr marL="0" indent="0">
+              <a:buNone/>
+            </a:pPr>
+            <a:endParaRPr lang="en-US" dirty="0" smtClean="0"/>
+          </a:p>
+          <a:p>
+            <a:pPr marL="0" indent="0">
+              <a:buNone/>
+            </a:pPr>
+            <a:r>
+              <a:rPr lang="en-US" dirty="0" smtClean="0"/>
+              <a:t>In the process we would use of several technologies we haven’t had a chance to explore in our current projects.</a:t>
+            </a:r>
+            <a:endParaRPr lang="en-US" dirty="0"/>
           </a:p>
         </p:txBody>
       </p:sp>
@@ -4025,13 +4093,84 @@
           <a:bodyPr/>
           <a:lstStyle/>
           <a:p>
-            <a:pPr marL="0" indent="0">
-              <a:buNone/>
+            <a:pPr>
+              <a:buFontTx/>
+              <a:buChar char="-"/>
             </a:pPr>
             <a:r>
-              <a:rPr lang="en-US" dirty="0"/>
-              <a:t>&lt;&lt;Even if you didn’t achieve anything, at least you learned something, tell us…&gt;&gt;</a:t>
-            </a:r>
+              <a:rPr lang="en-US" dirty="0" err="1" smtClean="0"/>
+              <a:t>MediatR</a:t>
+            </a:r>
+            <a:r>
+              <a:rPr lang="en-US" dirty="0" smtClean="0"/>
+              <a:t> requests are generically being cached in </a:t>
+            </a:r>
+            <a:r>
+              <a:rPr lang="en-US" dirty="0" err="1" smtClean="0"/>
+              <a:t>Redis</a:t>
+            </a:r>
+            <a:endParaRPr lang="en-US" dirty="0" smtClean="0"/>
+          </a:p>
+          <a:p>
+            <a:pPr>
+              <a:buFontTx/>
+              <a:buChar char="-"/>
+            </a:pPr>
+            <a:r>
+              <a:rPr lang="en-US" dirty="0" smtClean="0"/>
+              <a:t>Every type of request has a Polly fallback policy that returns results from a </a:t>
+            </a:r>
+            <a:r>
+              <a:rPr lang="en-US" dirty="0" err="1" smtClean="0"/>
+              <a:t>Redis</a:t>
+            </a:r>
+            <a:r>
+              <a:rPr lang="en-US" dirty="0" smtClean="0"/>
+              <a:t>-based caching store </a:t>
+            </a:r>
+            <a:r>
+              <a:rPr lang="en-US" dirty="0" smtClean="0"/>
+              <a:t>when the </a:t>
+            </a:r>
+            <a:r>
+              <a:rPr lang="en-US" dirty="0" smtClean="0"/>
+              <a:t>depende</a:t>
+            </a:r>
+            <a:r>
+              <a:rPr lang="en-US" dirty="0" smtClean="0"/>
+              <a:t>ncy fails. </a:t>
+            </a:r>
+          </a:p>
+          <a:p>
+            <a:pPr>
+              <a:buFontTx/>
+              <a:buChar char="-"/>
+            </a:pPr>
+            <a:r>
+              <a:rPr lang="en-US" dirty="0" smtClean="0"/>
+              <a:t>The Polly policy is set to break the circuit after a number of failures, to speed up response times when a dependency is unavailable.</a:t>
+            </a:r>
+          </a:p>
+          <a:p>
+            <a:pPr>
+              <a:buFontTx/>
+              <a:buChar char="-"/>
+            </a:pPr>
+            <a:r>
+              <a:rPr lang="en-US" dirty="0" smtClean="0"/>
+              <a:t>We have a dashboard to monitor the state of the circuit breaker.</a:t>
+            </a:r>
+          </a:p>
+          <a:p>
+            <a:pPr>
+              <a:buFontTx/>
+              <a:buChar char="-"/>
+            </a:pPr>
+            <a:r>
+              <a:rPr lang="en-US" dirty="0" smtClean="0"/>
+              <a:t>Tetris</a:t>
+            </a:r>
+            <a:endParaRPr lang="en-US" dirty="0"/>
           </a:p>
         </p:txBody>
       </p:sp>
@@ -4144,13 +4283,81 @@
           <a:bodyPr/>
           <a:lstStyle/>
           <a:p>
+            <a:pPr>
+              <a:buFontTx/>
+              <a:buChar char="-"/>
+            </a:pPr>
+            <a:r>
+              <a:rPr lang="en-US" dirty="0" smtClean="0"/>
+              <a:t>We have a great logo.</a:t>
+            </a:r>
+          </a:p>
+          <a:p>
+            <a:pPr>
+              <a:buFontTx/>
+              <a:buChar char="-"/>
+            </a:pPr>
+            <a:r>
+              <a:rPr lang="en-US" dirty="0" smtClean="0"/>
+              <a:t>The team kick-off</a:t>
+            </a:r>
+            <a:endParaRPr lang="en-US" dirty="0" smtClean="0"/>
+          </a:p>
+          <a:p>
+            <a:pPr>
+              <a:buFontTx/>
+              <a:buChar char="-"/>
+            </a:pPr>
+            <a:r>
+              <a:rPr lang="en-US" dirty="0" smtClean="0"/>
+              <a:t>Using Polly.</a:t>
+            </a:r>
+          </a:p>
+          <a:p>
+            <a:pPr>
+              <a:buFontTx/>
+              <a:buChar char="-"/>
+            </a:pPr>
+            <a:r>
+              <a:rPr lang="en-US" dirty="0" err="1" smtClean="0"/>
+              <a:t>MediatR</a:t>
+            </a:r>
+            <a:r>
+              <a:rPr lang="en-US" dirty="0" smtClean="0"/>
+              <a:t> + Polly to create a caching decorator.</a:t>
+            </a:r>
+          </a:p>
+          <a:p>
+            <a:pPr>
+              <a:buFontTx/>
+              <a:buChar char="-"/>
+            </a:pPr>
+            <a:r>
+              <a:rPr lang="en-US" dirty="0" err="1" smtClean="0"/>
+              <a:t>SignalR</a:t>
+            </a:r>
+            <a:r>
+              <a:rPr lang="en-US" dirty="0" smtClean="0"/>
+              <a:t> to create a real-time dashboard.</a:t>
+            </a:r>
+            <a:endParaRPr lang="en-US" dirty="0" smtClean="0"/>
+          </a:p>
+          <a:p>
+            <a:pPr>
+              <a:buFontTx/>
+              <a:buChar char="-"/>
+            </a:pPr>
+            <a:r>
+              <a:rPr lang="en-US" dirty="0" smtClean="0"/>
+              <a:t>Tetris.</a:t>
+            </a:r>
+            <a:endParaRPr lang="en-US" dirty="0" smtClean="0"/>
+          </a:p>
+          <a:p>
             <a:pPr marL="0" indent="0">
               <a:buNone/>
             </a:pPr>
-            <a:r>
-              <a:rPr lang="en-US" dirty="0"/>
-              <a:t>&lt;&lt;Besides the great food, the good vibe, you surely had something that worked out really nice ?&gt;&gt;</a:t>
-            </a:r>
+            <a:endParaRPr lang="en-US" dirty="0"/>
           </a:p>
         </p:txBody>
       </p:sp>
@@ -4263,12 +4470,50 @@
           <a:bodyPr/>
           <a:lstStyle/>
           <a:p>
-            <a:pPr marL="0" indent="0">
-              <a:buNone/>
+            <a:pPr>
+              <a:buFontTx/>
+              <a:buChar char="-"/>
             </a:pPr>
             <a:r>
-              <a:rPr lang="en-US" dirty="0"/>
-              <a:t>&lt;&lt;Without failure you can’t learn anything, which road shouldn’t we travel according to your project?&gt;&gt;</a:t>
+              <a:rPr lang="en-US" dirty="0" smtClean="0"/>
+              <a:t>Setting up an automatic app service deployment linked to </a:t>
+            </a:r>
+            <a:r>
+              <a:rPr lang="en-US" dirty="0" err="1" smtClean="0"/>
+              <a:t>github</a:t>
+            </a:r>
+            <a:r>
+              <a:rPr lang="en-US" dirty="0" smtClean="0"/>
+              <a:t>.</a:t>
+            </a:r>
+          </a:p>
+          <a:p>
+            <a:pPr>
+              <a:buFontTx/>
+              <a:buChar char="-"/>
+            </a:pPr>
+            <a:r>
+              <a:rPr lang="en-US" dirty="0" smtClean="0"/>
+              <a:t>Generics and </a:t>
+            </a:r>
+            <a:r>
+              <a:rPr lang="en-US" dirty="0" err="1" smtClean="0"/>
+              <a:t>PostSharp</a:t>
+            </a:r>
+            <a:r>
+              <a:rPr lang="en-US" dirty="0" smtClean="0"/>
+              <a:t> aspects don’t mix.</a:t>
+            </a:r>
+            <a:endParaRPr lang="en-US" dirty="0"/>
+          </a:p>
+          <a:p>
+            <a:pPr>
+              <a:buFontTx/>
+              <a:buChar char="-"/>
+            </a:pPr>
+            <a:r>
+              <a:rPr lang="en-US" dirty="0" smtClean="0"/>
+              <a:t>Not all team members had the proper tools.</a:t>
             </a:r>
           </a:p>
         </p:txBody>
@@ -4390,13 +4635,49 @@
           <a:bodyPr/>
           <a:lstStyle/>
           <a:p>
-            <a:pPr marL="0" indent="0">
-              <a:buNone/>
+            <a:pPr>
+              <a:buFontTx/>
+              <a:buChar char="-"/>
             </a:pPr>
             <a:r>
-              <a:rPr lang="en-US" dirty="0"/>
-              <a:t>&lt;&lt;The management has to stay happy also, if we can convince them of another exploration day, it’s with this slide…&gt;&gt;</a:t>
-            </a:r>
+              <a:rPr lang="en-US" dirty="0" smtClean="0"/>
+              <a:t>Polly (+ </a:t>
+            </a:r>
+            <a:r>
+              <a:rPr lang="en-US" dirty="0" err="1" smtClean="0"/>
+              <a:t>MediatR</a:t>
+            </a:r>
+            <a:r>
+              <a:rPr lang="en-US" dirty="0" smtClean="0"/>
+              <a:t>) to create more resilient applications</a:t>
+            </a:r>
+          </a:p>
+          <a:p>
+            <a:pPr>
+              <a:buFontTx/>
+              <a:buChar char="-"/>
+            </a:pPr>
+            <a:r>
+              <a:rPr lang="en-US" dirty="0" smtClean="0"/>
+              <a:t>Feature toggle as a service can give an easy way to have fine-grained control over who can use certain features and when.</a:t>
+            </a:r>
+          </a:p>
+          <a:p>
+            <a:pPr>
+              <a:buFontTx/>
+              <a:buChar char="-"/>
+            </a:pPr>
+            <a:r>
+              <a:rPr lang="en-US" dirty="0" smtClean="0"/>
+              <a:t>Logo design.</a:t>
+            </a:r>
+          </a:p>
+          <a:p>
+            <a:pPr>
+              <a:buFontTx/>
+              <a:buChar char="-"/>
+            </a:pPr>
+            <a:endParaRPr lang="en-US" dirty="0"/>
           </a:p>
         </p:txBody>
       </p:sp>
@@ -4509,18 +4790,50 @@
           <a:bodyPr/>
           <a:lstStyle/>
           <a:p>
-            <a:pPr marL="0" indent="0">
-              <a:buNone/>
+            <a:pPr>
+              <a:buFontTx/>
+              <a:buChar char="-"/>
             </a:pPr>
             <a:r>
-              <a:rPr lang="en-US" dirty="0"/>
-              <a:t>&lt;&lt;Is this the end of this project ? Or am I a real entrepreneur and do I continue to work </a:t>
-            </a:r>
-            <a:r>
-              <a:rPr lang="en-US"/>
-              <a:t>on this ?&gt;&gt;</a:t>
-            </a:r>
-            <a:endParaRPr lang="en-US" dirty="0"/>
+              <a:rPr lang="en-US" dirty="0" smtClean="0"/>
+              <a:t>Polly + </a:t>
+            </a:r>
+            <a:r>
+              <a:rPr lang="en-US" dirty="0" err="1" smtClean="0"/>
+              <a:t>MediatR</a:t>
+            </a:r>
+            <a:r>
+              <a:rPr lang="en-US" dirty="0" smtClean="0"/>
+              <a:t> to store and replay commands.</a:t>
+            </a:r>
+          </a:p>
+          <a:p>
+            <a:pPr>
+              <a:buFontTx/>
+              <a:buChar char="-"/>
+            </a:pPr>
+            <a:r>
+              <a:rPr lang="en-US" dirty="0" smtClean="0"/>
+              <a:t>Create a package to easily integrate this into other projects.</a:t>
+            </a:r>
+          </a:p>
+          <a:p>
+            <a:pPr>
+              <a:buFontTx/>
+              <a:buChar char="-"/>
+            </a:pPr>
+            <a:r>
+              <a:rPr lang="en-US" dirty="0" smtClean="0"/>
+              <a:t>Make an aspect that doesn’t depend on </a:t>
+            </a:r>
+            <a:r>
+              <a:rPr lang="en-US" dirty="0" err="1" smtClean="0"/>
+              <a:t>MediatR</a:t>
+            </a:r>
+            <a:r>
+              <a:rPr lang="en-US" dirty="0" smtClean="0"/>
+              <a:t>.</a:t>
+            </a:r>
           </a:p>
         </p:txBody>
       </p:sp>

</xml_diff>